<commit_message>
produce package install script
</commit_message>
<xml_diff>
--- a/slides/data_science_workshop_slides.pptx
+++ b/slides/data_science_workshop_slides.pptx
@@ -6,13 +6,14 @@
   </p:sldMasterIdLst>
   <p:sldIdLst>
     <p:sldId id="256" r:id="rId2"/>
-    <p:sldId id="262" r:id="rId3"/>
-    <p:sldId id="263" r:id="rId4"/>
-    <p:sldId id="259" r:id="rId5"/>
-    <p:sldId id="260" r:id="rId6"/>
-    <p:sldId id="261" r:id="rId7"/>
-    <p:sldId id="257" r:id="rId8"/>
-    <p:sldId id="258" r:id="rId9"/>
+    <p:sldId id="264" r:id="rId3"/>
+    <p:sldId id="262" r:id="rId4"/>
+    <p:sldId id="263" r:id="rId5"/>
+    <p:sldId id="259" r:id="rId6"/>
+    <p:sldId id="260" r:id="rId7"/>
+    <p:sldId id="261" r:id="rId8"/>
+    <p:sldId id="257" r:id="rId9"/>
+    <p:sldId id="258" r:id="rId10"/>
   </p:sldIdLst>
   <p:sldSz cx="12192000" cy="6858000"/>
   <p:notesSz cx="6858000" cy="9144000"/>
@@ -117,6 +118,7 @@
         <p14:section name="Default Section" id="{50622E5F-8199-4FF2-897D-46AF92800C7E}">
           <p14:sldIdLst>
             <p14:sldId id="256"/>
+            <p14:sldId id="264"/>
             <p14:sldId id="262"/>
             <p14:sldId id="263"/>
             <p14:sldId id="259"/>
@@ -266,7 +268,7 @@
           <a:p>
             <a:fld id="{D2AB979D-9077-42B2-BBB0-38D166DD3024}" type="datetimeFigureOut">
               <a:rPr lang="en-GB" smtClean="0"/>
-              <a:t>15/04/2016</a:t>
+              <a:t>21/04/2016</a:t>
             </a:fld>
             <a:endParaRPr lang="en-GB"/>
           </a:p>
@@ -436,7 +438,7 @@
           <a:p>
             <a:fld id="{D2AB979D-9077-42B2-BBB0-38D166DD3024}" type="datetimeFigureOut">
               <a:rPr lang="en-GB" smtClean="0"/>
-              <a:t>15/04/2016</a:t>
+              <a:t>21/04/2016</a:t>
             </a:fld>
             <a:endParaRPr lang="en-GB"/>
           </a:p>
@@ -616,7 +618,7 @@
           <a:p>
             <a:fld id="{D2AB979D-9077-42B2-BBB0-38D166DD3024}" type="datetimeFigureOut">
               <a:rPr lang="en-GB" smtClean="0"/>
-              <a:t>15/04/2016</a:t>
+              <a:t>21/04/2016</a:t>
             </a:fld>
             <a:endParaRPr lang="en-GB"/>
           </a:p>
@@ -786,7 +788,7 @@
           <a:p>
             <a:fld id="{D2AB979D-9077-42B2-BBB0-38D166DD3024}" type="datetimeFigureOut">
               <a:rPr lang="en-GB" smtClean="0"/>
-              <a:t>15/04/2016</a:t>
+              <a:t>21/04/2016</a:t>
             </a:fld>
             <a:endParaRPr lang="en-GB"/>
           </a:p>
@@ -1032,7 +1034,7 @@
           <a:p>
             <a:fld id="{D2AB979D-9077-42B2-BBB0-38D166DD3024}" type="datetimeFigureOut">
               <a:rPr lang="en-GB" smtClean="0"/>
-              <a:t>15/04/2016</a:t>
+              <a:t>21/04/2016</a:t>
             </a:fld>
             <a:endParaRPr lang="en-GB"/>
           </a:p>
@@ -1264,7 +1266,7 @@
           <a:p>
             <a:fld id="{D2AB979D-9077-42B2-BBB0-38D166DD3024}" type="datetimeFigureOut">
               <a:rPr lang="en-GB" smtClean="0"/>
-              <a:t>15/04/2016</a:t>
+              <a:t>21/04/2016</a:t>
             </a:fld>
             <a:endParaRPr lang="en-GB"/>
           </a:p>
@@ -1631,7 +1633,7 @@
           <a:p>
             <a:fld id="{D2AB979D-9077-42B2-BBB0-38D166DD3024}" type="datetimeFigureOut">
               <a:rPr lang="en-GB" smtClean="0"/>
-              <a:t>15/04/2016</a:t>
+              <a:t>21/04/2016</a:t>
             </a:fld>
             <a:endParaRPr lang="en-GB"/>
           </a:p>
@@ -1749,7 +1751,7 @@
           <a:p>
             <a:fld id="{D2AB979D-9077-42B2-BBB0-38D166DD3024}" type="datetimeFigureOut">
               <a:rPr lang="en-GB" smtClean="0"/>
-              <a:t>15/04/2016</a:t>
+              <a:t>21/04/2016</a:t>
             </a:fld>
             <a:endParaRPr lang="en-GB"/>
           </a:p>
@@ -1844,7 +1846,7 @@
           <a:p>
             <a:fld id="{D2AB979D-9077-42B2-BBB0-38D166DD3024}" type="datetimeFigureOut">
               <a:rPr lang="en-GB" smtClean="0"/>
-              <a:t>15/04/2016</a:t>
+              <a:t>21/04/2016</a:t>
             </a:fld>
             <a:endParaRPr lang="en-GB"/>
           </a:p>
@@ -2121,7 +2123,7 @@
           <a:p>
             <a:fld id="{D2AB979D-9077-42B2-BBB0-38D166DD3024}" type="datetimeFigureOut">
               <a:rPr lang="en-GB" smtClean="0"/>
-              <a:t>15/04/2016</a:t>
+              <a:t>21/04/2016</a:t>
             </a:fld>
             <a:endParaRPr lang="en-GB"/>
           </a:p>
@@ -2374,7 +2376,7 @@
           <a:p>
             <a:fld id="{D2AB979D-9077-42B2-BBB0-38D166DD3024}" type="datetimeFigureOut">
               <a:rPr lang="en-GB" smtClean="0"/>
-              <a:t>15/04/2016</a:t>
+              <a:t>21/04/2016</a:t>
             </a:fld>
             <a:endParaRPr lang="en-GB"/>
           </a:p>
@@ -2587,7 +2589,7 @@
           <a:p>
             <a:fld id="{D2AB979D-9077-42B2-BBB0-38D166DD3024}" type="datetimeFigureOut">
               <a:rPr lang="en-GB" smtClean="0"/>
-              <a:t>15/04/2016</a:t>
+              <a:t>21/04/2016</a:t>
             </a:fld>
             <a:endParaRPr lang="en-GB"/>
           </a:p>
@@ -3104,7 +3106,7 @@
           <a:p>
             <a:r>
               <a:rPr lang="en-GB" dirty="0" smtClean="0"/>
-              <a:t>Introduction: Data Management and Data Science</a:t>
+              <a:t>Some e-housekeeping</a:t>
             </a:r>
             <a:endParaRPr lang="en-GB" dirty="0"/>
           </a:p>
@@ -3123,66 +3125,146 @@
         <p:spPr/>
         <p:txBody>
           <a:bodyPr>
-            <a:normAutofit lnSpcReduction="10000"/>
+            <a:normAutofit fontScale="92500"/>
           </a:bodyPr>
           <a:lstStyle/>
           <a:p>
             <a:r>
               <a:rPr lang="en-GB" dirty="0" smtClean="0"/>
-              <a:t>Managing (Tidying and Cleaning) datasets often take most of the time involved in doing quantitative research (50-80%)</a:t>
-            </a:r>
-          </a:p>
-          <a:p>
-            <a:r>
-              <a:rPr lang="en-GB" dirty="0" smtClean="0"/>
-              <a:t>Whereas there are many courses on how to apply various statistical models to data in a particular form, there are far fewer on how to get the data into that form.</a:t>
-            </a:r>
-          </a:p>
-          <a:p>
-            <a:r>
-              <a:rPr lang="en-GB" dirty="0" smtClean="0"/>
-              <a:t>If data scientists are anything, they’re </a:t>
-            </a:r>
-            <a:r>
-              <a:rPr lang="en-GB" b="1" i="1" dirty="0" smtClean="0"/>
-              <a:t>generalists</a:t>
+              <a:t>Select </a:t>
+            </a:r>
+            <a:r>
+              <a:rPr lang="en-GB" dirty="0" err="1" smtClean="0"/>
+              <a:t>Rstudio</a:t>
+            </a:r>
+            <a:r>
+              <a:rPr lang="en-GB" dirty="0" smtClean="0"/>
+              <a:t> (folder) -&gt; </a:t>
+            </a:r>
+            <a:r>
+              <a:rPr lang="en-GB" dirty="0" err="1" smtClean="0"/>
+              <a:t>Rstudio</a:t>
+            </a:r>
+            <a:r>
+              <a:rPr lang="en-GB" dirty="0" smtClean="0"/>
+              <a:t> (program) to open </a:t>
+            </a:r>
+            <a:r>
+              <a:rPr lang="en-GB" dirty="0" err="1" smtClean="0"/>
+              <a:t>Rstudio</a:t>
+            </a:r>
+            <a:endParaRPr lang="en-GB" dirty="0" smtClean="0"/>
+          </a:p>
+          <a:p>
+            <a:r>
+              <a:rPr lang="en-GB" dirty="0"/>
+              <a:t>W</a:t>
+            </a:r>
+            <a:r>
+              <a:rPr lang="en-GB" dirty="0" smtClean="0"/>
+              <a:t>rite the following in the bottom left pane:</a:t>
+            </a:r>
+          </a:p>
+          <a:p>
+            <a:pPr marL="0" indent="0">
+              <a:buNone/>
+            </a:pPr>
+            <a:r>
+              <a:rPr lang="en-GB" dirty="0" err="1"/>
+              <a:t>install.packages</a:t>
+            </a:r>
+            <a:r>
+              <a:rPr lang="en-GB" dirty="0"/>
+              <a:t>(c("</a:t>
+            </a:r>
+            <a:r>
+              <a:rPr lang="en-GB" dirty="0" err="1"/>
+              <a:t>readr</a:t>
+            </a:r>
+            <a:r>
+              <a:rPr lang="en-GB" dirty="0"/>
+              <a:t>", "haven", "</a:t>
+            </a:r>
+            <a:r>
+              <a:rPr lang="en-GB" dirty="0" err="1"/>
+              <a:t>readxl</a:t>
+            </a:r>
+            <a:r>
+              <a:rPr lang="en-GB" dirty="0"/>
+              <a:t>", "</a:t>
+            </a:r>
+            <a:r>
+              <a:rPr lang="en-GB" dirty="0" err="1"/>
+              <a:t>stringr</a:t>
+            </a:r>
+            <a:r>
+              <a:rPr lang="en-GB" dirty="0"/>
+              <a:t>", "</a:t>
+            </a:r>
+            <a:r>
+              <a:rPr lang="en-GB" dirty="0" err="1"/>
+              <a:t>tidyr</a:t>
+            </a:r>
+            <a:r>
+              <a:rPr lang="en-GB" dirty="0"/>
+              <a:t>", "</a:t>
+            </a:r>
+            <a:r>
+              <a:rPr lang="en-GB" dirty="0" err="1"/>
+              <a:t>plyr</a:t>
+            </a:r>
+            <a:r>
+              <a:rPr lang="en-GB" dirty="0"/>
+              <a:t>", "</a:t>
+            </a:r>
+            <a:r>
+              <a:rPr lang="en-GB" dirty="0" err="1"/>
+              <a:t>dplyr</a:t>
+            </a:r>
+            <a:r>
+              <a:rPr lang="en-GB" dirty="0"/>
+              <a:t>", "car", "ggplot2", "</a:t>
+            </a:r>
+            <a:r>
+              <a:rPr lang="en-GB" dirty="0" err="1" smtClean="0"/>
+              <a:t>xlsx</a:t>
+            </a:r>
+            <a:r>
+              <a:rPr lang="en-GB" dirty="0" smtClean="0"/>
+              <a:t>"))</a:t>
+            </a:r>
+          </a:p>
+          <a:p>
+            <a:pPr marL="0" indent="0">
+              <a:buNone/>
+            </a:pPr>
+            <a:endParaRPr lang="en-GB" dirty="0"/>
+          </a:p>
+          <a:p>
+            <a:r>
+              <a:rPr lang="en-GB" dirty="0" smtClean="0"/>
+              <a:t>Alternatively, copy and paste the script from the following URL:</a:t>
             </a:r>
           </a:p>
           <a:p>
             <a:pPr lvl="1"/>
             <a:r>
-              <a:rPr lang="en-GB" dirty="0" smtClean="0"/>
-              <a:t>And they’re valuable (commercially if not academically) </a:t>
-            </a:r>
-            <a:r>
-              <a:rPr lang="en-GB" i="1" dirty="0" smtClean="0"/>
-              <a:t>because</a:t>
-            </a:r>
-            <a:r>
-              <a:rPr lang="en-GB" dirty="0" smtClean="0"/>
-              <a:t> they’re generalists.</a:t>
-            </a:r>
-          </a:p>
-          <a:p>
-            <a:r>
-              <a:rPr lang="en-GB" b="1" dirty="0" smtClean="0"/>
-              <a:t>Tidy Data</a:t>
-            </a:r>
-            <a:r>
-              <a:rPr lang="en-GB" dirty="0" smtClean="0"/>
-              <a:t>: a good format for data analysis</a:t>
-            </a:r>
-          </a:p>
-          <a:p>
-            <a:r>
-              <a:rPr lang="en-GB" dirty="0" smtClean="0"/>
-              <a:t>Making data Tidy makes rapid and iterative analysis much easier</a:t>
-            </a:r>
-          </a:p>
-          <a:p>
+              <a:rPr lang="en-GB" dirty="0" smtClean="0">
+                <a:hlinkClick r:id="rId2"/>
+              </a:rPr>
+              <a:t>https://github.com/JonMinton/aqmen_data_science/scripts/package_install_script.R</a:t>
+            </a:r>
             <a:endParaRPr lang="en-GB" dirty="0" smtClean="0"/>
           </a:p>
           <a:p>
+            <a:pPr lvl="1"/>
+            <a:endParaRPr lang="en-GB" dirty="0"/>
+          </a:p>
+          <a:p>
+            <a:r>
+              <a:rPr lang="en-GB" dirty="0" smtClean="0"/>
+              <a:t>Various R packages will be loaded. While it’s doing this, let’s talk more about the course…</a:t>
+            </a:r>
             <a:endParaRPr lang="en-GB" dirty="0"/>
           </a:p>
         </p:txBody>
@@ -3190,7 +3272,7 @@
     </p:spTree>
     <p:extLst>
       <p:ext uri="{BB962C8B-B14F-4D97-AF65-F5344CB8AC3E}">
-        <p14:creationId xmlns:p14="http://schemas.microsoft.com/office/powerpoint/2010/main" val="3493097886"/>
+        <p14:creationId xmlns:p14="http://schemas.microsoft.com/office/powerpoint/2010/main" val="1039086265"/>
       </p:ext>
     </p:extLst>
   </p:cSld>
@@ -3234,15 +3316,137 @@
           <a:p>
             <a:r>
               <a:rPr lang="en-GB" dirty="0" smtClean="0"/>
-              <a:t>Data Science: </a:t>
-            </a:r>
-            <a:r>
-              <a:rPr lang="en-GB" dirty="0" smtClean="0"/>
-              <a:t>nimble (quick-and-dirty) </a:t>
-            </a:r>
-            <a:r>
-              <a:rPr lang="en-GB" dirty="0" smtClean="0"/>
-              <a:t>analysis and insight</a:t>
+              <a:t>Introduction: Data Management and Data Science</a:t>
+            </a:r>
+            <a:endParaRPr lang="en-GB" dirty="0"/>
+          </a:p>
+        </p:txBody>
+      </p:sp>
+      <p:sp>
+        <p:nvSpPr>
+          <p:cNvPr id="3" name="Content Placeholder 2"/>
+          <p:cNvSpPr>
+            <a:spLocks noGrp="1"/>
+          </p:cNvSpPr>
+          <p:nvPr>
+            <p:ph idx="1"/>
+          </p:nvPr>
+        </p:nvSpPr>
+        <p:spPr/>
+        <p:txBody>
+          <a:bodyPr>
+            <a:normAutofit lnSpcReduction="10000"/>
+          </a:bodyPr>
+          <a:lstStyle/>
+          <a:p>
+            <a:r>
+              <a:rPr lang="en-GB" dirty="0" smtClean="0"/>
+              <a:t>Managing (Tidying and Cleaning) datasets often take most of the time involved in doing quantitative research (50-80%)</a:t>
+            </a:r>
+          </a:p>
+          <a:p>
+            <a:r>
+              <a:rPr lang="en-GB" dirty="0" smtClean="0"/>
+              <a:t>Whereas there are many courses on how to apply various statistical models to data in a particular form, there are far fewer on how to get the data into that form.</a:t>
+            </a:r>
+          </a:p>
+          <a:p>
+            <a:r>
+              <a:rPr lang="en-GB" dirty="0" smtClean="0"/>
+              <a:t>If data scientists are anything, they’re </a:t>
+            </a:r>
+            <a:r>
+              <a:rPr lang="en-GB" b="1" i="1" dirty="0" smtClean="0"/>
+              <a:t>generalists</a:t>
+            </a:r>
+          </a:p>
+          <a:p>
+            <a:pPr lvl="1"/>
+            <a:r>
+              <a:rPr lang="en-GB" dirty="0" smtClean="0"/>
+              <a:t>And they’re valuable (commercially if not academically) </a:t>
+            </a:r>
+            <a:r>
+              <a:rPr lang="en-GB" i="1" dirty="0" smtClean="0"/>
+              <a:t>because</a:t>
+            </a:r>
+            <a:r>
+              <a:rPr lang="en-GB" dirty="0" smtClean="0"/>
+              <a:t> they’re generalists.</a:t>
+            </a:r>
+          </a:p>
+          <a:p>
+            <a:r>
+              <a:rPr lang="en-GB" b="1" dirty="0" smtClean="0"/>
+              <a:t>Tidy Data</a:t>
+            </a:r>
+            <a:r>
+              <a:rPr lang="en-GB" dirty="0" smtClean="0"/>
+              <a:t>: a good format for data analysis</a:t>
+            </a:r>
+          </a:p>
+          <a:p>
+            <a:r>
+              <a:rPr lang="en-GB" dirty="0" smtClean="0"/>
+              <a:t>Making data Tidy makes rapid and iterative analysis much easier</a:t>
+            </a:r>
+          </a:p>
+          <a:p>
+            <a:endParaRPr lang="en-GB" dirty="0" smtClean="0"/>
+          </a:p>
+          <a:p>
+            <a:endParaRPr lang="en-GB" dirty="0"/>
+          </a:p>
+        </p:txBody>
+      </p:sp>
+    </p:spTree>
+    <p:extLst>
+      <p:ext uri="{BB962C8B-B14F-4D97-AF65-F5344CB8AC3E}">
+        <p14:creationId xmlns:p14="http://schemas.microsoft.com/office/powerpoint/2010/main" val="3493097886"/>
+      </p:ext>
+    </p:extLst>
+  </p:cSld>
+  <p:clrMapOvr>
+    <a:masterClrMapping/>
+  </p:clrMapOvr>
+</p:sld>
+</file>
+
+<file path=ppt/slides/slide4.xml><?xml version="1.0" encoding="utf-8"?>
+<p:sld xmlns:a="http://schemas.openxmlformats.org/drawingml/2006/main" xmlns:r="http://schemas.openxmlformats.org/officeDocument/2006/relationships" xmlns:p="http://schemas.openxmlformats.org/presentationml/2006/main">
+  <p:cSld>
+    <p:spTree>
+      <p:nvGrpSpPr>
+        <p:cNvPr id="1" name=""/>
+        <p:cNvGrpSpPr/>
+        <p:nvPr/>
+      </p:nvGrpSpPr>
+      <p:grpSpPr>
+        <a:xfrm>
+          <a:off x="0" y="0"/>
+          <a:ext cx="0" cy="0"/>
+          <a:chOff x="0" y="0"/>
+          <a:chExt cx="0" cy="0"/>
+        </a:xfrm>
+      </p:grpSpPr>
+      <p:sp>
+        <p:nvSpPr>
+          <p:cNvPr id="2" name="Title 1"/>
+          <p:cNvSpPr>
+            <a:spLocks noGrp="1"/>
+          </p:cNvSpPr>
+          <p:nvPr>
+            <p:ph type="title"/>
+          </p:nvPr>
+        </p:nvSpPr>
+        <p:spPr/>
+        <p:txBody>
+          <a:bodyPr/>
+          <a:lstStyle/>
+          <a:p>
+            <a:r>
+              <a:rPr lang="en-GB" dirty="0" smtClean="0"/>
+              <a:t>Data Science: nimble (quick-and-dirty) analysis and insight</a:t>
             </a:r>
             <a:endParaRPr lang="en-GB" dirty="0"/>
           </a:p>
@@ -5849,150 +6053,102 @@
           </a:p>
         </p:txBody>
       </p:sp>
+      <p:sp>
+        <p:nvSpPr>
+          <p:cNvPr id="38" name="Rectangle 37"/>
+          <p:cNvSpPr/>
+          <p:nvPr/>
+        </p:nvSpPr>
+        <p:spPr>
+          <a:xfrm>
+            <a:off x="1487679" y="6167311"/>
+            <a:ext cx="2296655" cy="461665"/>
+          </a:xfrm>
+          <a:prstGeom prst="rect">
+            <a:avLst/>
+          </a:prstGeom>
+        </p:spPr>
+        <p:txBody>
+          <a:bodyPr wrap="none">
+            <a:spAutoFit/>
+          </a:bodyPr>
+          <a:lstStyle/>
+          <a:p>
+            <a:pPr algn="ctr"/>
+            <a:r>
+              <a:rPr lang="en-GB" sz="2400" b="1" i="1" dirty="0" smtClean="0">
+                <a:solidFill>
+                  <a:srgbClr val="C00000"/>
+                </a:solidFill>
+              </a:rPr>
+              <a:t>An</a:t>
+            </a:r>
+            <a:r>
+              <a:rPr lang="en-GB" sz="2000" b="1" i="1" dirty="0" smtClean="0">
+                <a:solidFill>
+                  <a:srgbClr val="C00000"/>
+                </a:solidFill>
+              </a:rPr>
+              <a:t> </a:t>
+            </a:r>
+            <a:r>
+              <a:rPr lang="en-GB" sz="2400" b="1" i="1" dirty="0" smtClean="0">
+                <a:solidFill>
+                  <a:srgbClr val="C00000"/>
+                </a:solidFill>
+              </a:rPr>
+              <a:t>Interrogation</a:t>
+            </a:r>
+            <a:endParaRPr lang="en-GB" sz="2000" i="1" dirty="0">
+              <a:solidFill>
+                <a:srgbClr val="C00000"/>
+              </a:solidFill>
+            </a:endParaRPr>
+          </a:p>
+        </p:txBody>
+      </p:sp>
+      <p:sp>
+        <p:nvSpPr>
+          <p:cNvPr id="65" name="Rectangle 64"/>
+          <p:cNvSpPr/>
+          <p:nvPr/>
+        </p:nvSpPr>
+        <p:spPr>
+          <a:xfrm>
+            <a:off x="7399193" y="6157640"/>
+            <a:ext cx="2113399" cy="461665"/>
+          </a:xfrm>
+          <a:prstGeom prst="rect">
+            <a:avLst/>
+          </a:prstGeom>
+        </p:spPr>
+        <p:txBody>
+          <a:bodyPr wrap="none">
+            <a:spAutoFit/>
+          </a:bodyPr>
+          <a:lstStyle/>
+          <a:p>
+            <a:pPr algn="ctr"/>
+            <a:r>
+              <a:rPr lang="en-GB" sz="2400" b="1" i="1" dirty="0" smtClean="0">
+                <a:solidFill>
+                  <a:srgbClr val="0070C0"/>
+                </a:solidFill>
+              </a:rPr>
+              <a:t>A Conversation</a:t>
+            </a:r>
+            <a:endParaRPr lang="en-GB" sz="2400" i="1" dirty="0">
+              <a:solidFill>
+                <a:srgbClr val="0070C0"/>
+              </a:solidFill>
+            </a:endParaRPr>
+          </a:p>
+        </p:txBody>
+      </p:sp>
     </p:spTree>
     <p:extLst>
       <p:ext uri="{BB962C8B-B14F-4D97-AF65-F5344CB8AC3E}">
         <p14:creationId xmlns:p14="http://schemas.microsoft.com/office/powerpoint/2010/main" val="539496712"/>
-      </p:ext>
-    </p:extLst>
-  </p:cSld>
-  <p:clrMapOvr>
-    <a:masterClrMapping/>
-  </p:clrMapOvr>
-</p:sld>
-</file>
-
-<file path=ppt/slides/slide4.xml><?xml version="1.0" encoding="utf-8"?>
-<p:sld xmlns:a="http://schemas.openxmlformats.org/drawingml/2006/main" xmlns:r="http://schemas.openxmlformats.org/officeDocument/2006/relationships" xmlns:p="http://schemas.openxmlformats.org/presentationml/2006/main">
-  <p:cSld>
-    <p:spTree>
-      <p:nvGrpSpPr>
-        <p:cNvPr id="1" name=""/>
-        <p:cNvGrpSpPr/>
-        <p:nvPr/>
-      </p:nvGrpSpPr>
-      <p:grpSpPr>
-        <a:xfrm>
-          <a:off x="0" y="0"/>
-          <a:ext cx="0" cy="0"/>
-          <a:chOff x="0" y="0"/>
-          <a:chExt cx="0" cy="0"/>
-        </a:xfrm>
-      </p:grpSpPr>
-      <p:sp>
-        <p:nvSpPr>
-          <p:cNvPr id="2" name="Title 1"/>
-          <p:cNvSpPr>
-            <a:spLocks noGrp="1"/>
-          </p:cNvSpPr>
-          <p:nvPr>
-            <p:ph type="title"/>
-          </p:nvPr>
-        </p:nvSpPr>
-        <p:spPr/>
-        <p:txBody>
-          <a:bodyPr/>
-          <a:lstStyle/>
-          <a:p>
-            <a:r>
-              <a:rPr lang="en-GB" dirty="0" smtClean="0"/>
-              <a:t>Approach to workshop</a:t>
-            </a:r>
-            <a:endParaRPr lang="en-GB" dirty="0"/>
-          </a:p>
-        </p:txBody>
-      </p:sp>
-      <p:sp>
-        <p:nvSpPr>
-          <p:cNvPr id="3" name="Content Placeholder 2"/>
-          <p:cNvSpPr>
-            <a:spLocks noGrp="1"/>
-          </p:cNvSpPr>
-          <p:nvPr>
-            <p:ph idx="1"/>
-          </p:nvPr>
-        </p:nvSpPr>
-        <p:spPr/>
-        <p:txBody>
-          <a:bodyPr/>
-          <a:lstStyle/>
-          <a:p>
-            <a:r>
-              <a:rPr lang="en-GB" b="1" dirty="0" smtClean="0"/>
-              <a:t>Challenges</a:t>
-            </a:r>
-            <a:r>
-              <a:rPr lang="en-GB" dirty="0" smtClean="0"/>
-              <a:t>: </a:t>
-            </a:r>
-          </a:p>
-          <a:p>
-            <a:pPr lvl="1"/>
-            <a:r>
-              <a:rPr lang="en-GB" dirty="0" smtClean="0"/>
-              <a:t>Much to cover</a:t>
-            </a:r>
-          </a:p>
-          <a:p>
-            <a:pPr lvl="1"/>
-            <a:r>
-              <a:rPr lang="en-GB" dirty="0" smtClean="0"/>
-              <a:t>Hurdles and barriers: conceptual and technical</a:t>
-            </a:r>
-          </a:p>
-          <a:p>
-            <a:pPr lvl="1"/>
-            <a:r>
-              <a:rPr lang="en-GB" dirty="0" smtClean="0"/>
-              <a:t>Different people likely to go at different paces</a:t>
-            </a:r>
-          </a:p>
-          <a:p>
-            <a:r>
-              <a:rPr lang="en-GB" b="1" dirty="0" smtClean="0"/>
-              <a:t>Solutions</a:t>
-            </a:r>
-            <a:r>
-              <a:rPr lang="en-GB" dirty="0" smtClean="0"/>
-              <a:t>:</a:t>
-            </a:r>
-          </a:p>
-          <a:p>
-            <a:pPr lvl="1"/>
-            <a:r>
-              <a:rPr lang="en-GB" dirty="0" smtClean="0"/>
-              <a:t>Handbook-based workshop with various exercises</a:t>
-            </a:r>
-          </a:p>
-          <a:p>
-            <a:pPr lvl="1"/>
-            <a:r>
-              <a:rPr lang="en-GB" dirty="0" smtClean="0"/>
-              <a:t>Support over two days (myself and </a:t>
-            </a:r>
-            <a:r>
-              <a:rPr lang="en-GB" dirty="0" err="1" smtClean="0"/>
-              <a:t>Mirjam</a:t>
-            </a:r>
-            <a:r>
-              <a:rPr lang="en-GB" dirty="0" smtClean="0"/>
-              <a:t>)</a:t>
-            </a:r>
-          </a:p>
-          <a:p>
-            <a:pPr lvl="1"/>
-            <a:r>
-              <a:rPr lang="en-GB" dirty="0" smtClean="0"/>
-              <a:t>Some opportunity in morning of day two to catch up if needed</a:t>
-            </a:r>
-            <a:endParaRPr lang="en-GB" dirty="0"/>
-          </a:p>
-        </p:txBody>
-      </p:sp>
-    </p:spTree>
-    <p:extLst>
-      <p:ext uri="{BB962C8B-B14F-4D97-AF65-F5344CB8AC3E}">
-        <p14:creationId xmlns:p14="http://schemas.microsoft.com/office/powerpoint/2010/main" val="4204691889"/>
       </p:ext>
     </p:extLst>
   </p:cSld>
@@ -6036,7 +6192,7 @@
           <a:p>
             <a:r>
               <a:rPr lang="en-GB" dirty="0" smtClean="0"/>
-              <a:t>Sections and exercises</a:t>
+              <a:t>Approach to workshop</a:t>
             </a:r>
             <a:endParaRPr lang="en-GB" dirty="0"/>
           </a:p>
@@ -6054,31 +6210,43 @@
         </p:nvSpPr>
         <p:spPr/>
         <p:txBody>
-          <a:bodyPr>
-            <a:normAutofit fontScale="77500" lnSpcReduction="20000"/>
-          </a:bodyPr>
-          <a:lstStyle/>
-          <a:p>
-            <a:r>
-              <a:rPr lang="en-GB" dirty="0" smtClean="0"/>
-              <a:t>Exercises are presented throughout sections, rather than at the end of sections, as prompts for reading and reflecting on the </a:t>
-            </a:r>
-            <a:r>
-              <a:rPr lang="en-GB" dirty="0" smtClean="0"/>
-              <a:t>material</a:t>
-            </a:r>
-          </a:p>
-          <a:p>
-            <a:endParaRPr lang="en-GB" dirty="0" smtClean="0"/>
-          </a:p>
-          <a:p>
-            <a:r>
-              <a:rPr lang="en-GB" dirty="0" smtClean="0"/>
-              <a:t>However </a:t>
-            </a:r>
-            <a:r>
-              <a:rPr lang="en-GB" b="1" i="1" dirty="0" smtClean="0"/>
-              <a:t>time is limited</a:t>
+          <a:bodyPr/>
+          <a:lstStyle/>
+          <a:p>
+            <a:r>
+              <a:rPr lang="en-GB" b="1" dirty="0" smtClean="0"/>
+              <a:t>Challenges</a:t>
+            </a:r>
+            <a:r>
+              <a:rPr lang="en-GB" dirty="0" smtClean="0"/>
+              <a:t>: </a:t>
+            </a:r>
+          </a:p>
+          <a:p>
+            <a:pPr lvl="1"/>
+            <a:r>
+              <a:rPr lang="en-GB" dirty="0" smtClean="0"/>
+              <a:t>Much to cover</a:t>
+            </a:r>
+          </a:p>
+          <a:p>
+            <a:pPr lvl="1"/>
+            <a:r>
+              <a:rPr lang="en-GB" dirty="0" smtClean="0"/>
+              <a:t>Hurdles and barriers: conceptual and technical</a:t>
+            </a:r>
+          </a:p>
+          <a:p>
+            <a:pPr lvl="1"/>
+            <a:r>
+              <a:rPr lang="en-GB" dirty="0" smtClean="0"/>
+              <a:t>Different people likely to go at different paces</a:t>
+            </a:r>
+          </a:p>
+          <a:p>
+            <a:r>
+              <a:rPr lang="en-GB" b="1" dirty="0" smtClean="0"/>
+              <a:t>Solutions</a:t>
             </a:r>
             <a:r>
               <a:rPr lang="en-GB" dirty="0" smtClean="0"/>
@@ -6089,18 +6257,18 @@
             <a:pPr lvl="1"/>
             <a:r>
               <a:rPr lang="en-GB" dirty="0" smtClean="0"/>
-              <a:t>Recommended schedules of what to cover by when (next few slides)</a:t>
+              <a:t>Handbook-based workshop with various exercises</a:t>
             </a:r>
           </a:p>
           <a:p>
             <a:pPr lvl="1"/>
             <a:r>
               <a:rPr lang="en-GB" dirty="0" smtClean="0"/>
-              <a:t>Within the schedule, ‘playing’ and exploration is encouraged (</a:t>
-            </a:r>
-            <a:r>
-              <a:rPr lang="en-GB" i="1" dirty="0" smtClean="0"/>
-              <a:t>What if…?</a:t>
+              <a:t>Support over two days (myself and </a:t>
+            </a:r>
+            <a:r>
+              <a:rPr lang="en-GB" dirty="0" err="1" smtClean="0"/>
+              <a:t>Mirjam</a:t>
             </a:r>
             <a:r>
               <a:rPr lang="en-GB" dirty="0" smtClean="0"/>
@@ -6111,57 +6279,7 @@
             <a:pPr lvl="1"/>
             <a:r>
               <a:rPr lang="en-GB" dirty="0" smtClean="0"/>
-              <a:t>Fine to jump ahead: If you get through all the materials, look at optional and advanced exercises, and do more ‘playing’</a:t>
-            </a:r>
-          </a:p>
-          <a:p>
-            <a:pPr lvl="1"/>
-            <a:r>
-              <a:rPr lang="en-GB" dirty="0" smtClean="0"/>
-              <a:t>If falling behind schedule, consider leaving some exercises to day two or later</a:t>
-            </a:r>
-          </a:p>
-          <a:p>
-            <a:pPr lvl="1"/>
-            <a:r>
-              <a:rPr lang="en-GB" dirty="0" smtClean="0"/>
-              <a:t>We’re here to help throughout.</a:t>
-            </a:r>
-          </a:p>
-          <a:p>
-            <a:pPr lvl="1"/>
-            <a:endParaRPr lang="en-GB" dirty="0"/>
-          </a:p>
-          <a:p>
-            <a:r>
-              <a:rPr lang="en-GB" b="1" dirty="0" smtClean="0"/>
-              <a:t>Overall aim</a:t>
-            </a:r>
-            <a:r>
-              <a:rPr lang="en-GB" dirty="0" smtClean="0"/>
-              <a:t>: </a:t>
-            </a:r>
-          </a:p>
-          <a:p>
-            <a:pPr lvl="1"/>
-            <a:r>
-              <a:rPr lang="en-GB" dirty="0" smtClean="0"/>
-              <a:t>For the two days to be informative and engaging, whatever your pace</a:t>
-            </a:r>
-          </a:p>
-          <a:p>
-            <a:pPr lvl="1"/>
-            <a:r>
-              <a:rPr lang="en-GB" dirty="0" smtClean="0"/>
-              <a:t>For you to want to continue learning and applying the approaches introduced here after the course (start of a </a:t>
-            </a:r>
-            <a:r>
-              <a:rPr lang="en-GB" i="1" dirty="0" smtClean="0"/>
-              <a:t>long</a:t>
-            </a:r>
-            <a:r>
-              <a:rPr lang="en-GB" dirty="0" smtClean="0"/>
-              <a:t> but enjoyable journey)</a:t>
+              <a:t>Some opportunity in morning of day two to catch up if needed</a:t>
             </a:r>
             <a:endParaRPr lang="en-GB" dirty="0"/>
           </a:p>
@@ -6170,7 +6288,7 @@
     </p:spTree>
     <p:extLst>
       <p:ext uri="{BB962C8B-B14F-4D97-AF65-F5344CB8AC3E}">
-        <p14:creationId xmlns:p14="http://schemas.microsoft.com/office/powerpoint/2010/main" val="2063942789"/>
+        <p14:creationId xmlns:p14="http://schemas.microsoft.com/office/powerpoint/2010/main" val="4204691889"/>
       </p:ext>
     </p:extLst>
   </p:cSld>
@@ -6214,6 +6332,180 @@
           <a:p>
             <a:r>
               <a:rPr lang="en-GB" dirty="0" smtClean="0"/>
+              <a:t>Sections and exercises</a:t>
+            </a:r>
+            <a:endParaRPr lang="en-GB" dirty="0"/>
+          </a:p>
+        </p:txBody>
+      </p:sp>
+      <p:sp>
+        <p:nvSpPr>
+          <p:cNvPr id="3" name="Content Placeholder 2"/>
+          <p:cNvSpPr>
+            <a:spLocks noGrp="1"/>
+          </p:cNvSpPr>
+          <p:nvPr>
+            <p:ph idx="1"/>
+          </p:nvPr>
+        </p:nvSpPr>
+        <p:spPr/>
+        <p:txBody>
+          <a:bodyPr>
+            <a:normAutofit fontScale="77500" lnSpcReduction="20000"/>
+          </a:bodyPr>
+          <a:lstStyle/>
+          <a:p>
+            <a:r>
+              <a:rPr lang="en-GB" dirty="0" smtClean="0"/>
+              <a:t>Exercises are presented throughout sections, rather than at the end of sections, as prompts for reading and reflecting on the material</a:t>
+            </a:r>
+          </a:p>
+          <a:p>
+            <a:endParaRPr lang="en-GB" dirty="0" smtClean="0"/>
+          </a:p>
+          <a:p>
+            <a:r>
+              <a:rPr lang="en-GB" dirty="0" smtClean="0"/>
+              <a:t>However </a:t>
+            </a:r>
+            <a:r>
+              <a:rPr lang="en-GB" b="1" i="1" dirty="0" smtClean="0"/>
+              <a:t>time is limited</a:t>
+            </a:r>
+            <a:r>
+              <a:rPr lang="en-GB" dirty="0" smtClean="0"/>
+              <a:t>:</a:t>
+            </a:r>
+          </a:p>
+          <a:p>
+            <a:pPr lvl="1"/>
+            <a:r>
+              <a:rPr lang="en-GB" dirty="0" smtClean="0"/>
+              <a:t>Recommended schedules of what to cover by when (next few slides)</a:t>
+            </a:r>
+          </a:p>
+          <a:p>
+            <a:pPr lvl="1"/>
+            <a:r>
+              <a:rPr lang="en-GB" dirty="0" smtClean="0"/>
+              <a:t>Within the schedule, ‘playing’ and exploration is encouraged (</a:t>
+            </a:r>
+            <a:r>
+              <a:rPr lang="en-GB" i="1" dirty="0" smtClean="0"/>
+              <a:t>What if…?</a:t>
+            </a:r>
+            <a:r>
+              <a:rPr lang="en-GB" dirty="0" smtClean="0"/>
+              <a:t>)</a:t>
+            </a:r>
+          </a:p>
+          <a:p>
+            <a:pPr lvl="1"/>
+            <a:r>
+              <a:rPr lang="en-GB" dirty="0" smtClean="0"/>
+              <a:t>Fine to jump ahead: If you get through all the materials, look at optional and advanced exercises, and do more ‘playing’</a:t>
+            </a:r>
+          </a:p>
+          <a:p>
+            <a:pPr lvl="1"/>
+            <a:r>
+              <a:rPr lang="en-GB" dirty="0" smtClean="0"/>
+              <a:t>If falling behind schedule, consider leaving some exercises to day two or later</a:t>
+            </a:r>
+          </a:p>
+          <a:p>
+            <a:pPr lvl="1"/>
+            <a:r>
+              <a:rPr lang="en-GB" dirty="0" smtClean="0"/>
+              <a:t>We’re here to help throughout.</a:t>
+            </a:r>
+          </a:p>
+          <a:p>
+            <a:pPr lvl="1"/>
+            <a:endParaRPr lang="en-GB" dirty="0"/>
+          </a:p>
+          <a:p>
+            <a:r>
+              <a:rPr lang="en-GB" b="1" dirty="0" smtClean="0"/>
+              <a:t>Overall aim</a:t>
+            </a:r>
+            <a:r>
+              <a:rPr lang="en-GB" dirty="0" smtClean="0"/>
+              <a:t>: </a:t>
+            </a:r>
+          </a:p>
+          <a:p>
+            <a:pPr lvl="1"/>
+            <a:r>
+              <a:rPr lang="en-GB" dirty="0" smtClean="0"/>
+              <a:t>For the two days to be informative and engaging, whatever your pace</a:t>
+            </a:r>
+          </a:p>
+          <a:p>
+            <a:pPr lvl="1"/>
+            <a:r>
+              <a:rPr lang="en-GB" dirty="0" smtClean="0"/>
+              <a:t>For you to want to continue learning and applying the approaches introduced here after the course (start of a </a:t>
+            </a:r>
+            <a:r>
+              <a:rPr lang="en-GB" i="1" dirty="0" smtClean="0"/>
+              <a:t>long</a:t>
+            </a:r>
+            <a:r>
+              <a:rPr lang="en-GB" dirty="0" smtClean="0"/>
+              <a:t> but enjoyable journey)</a:t>
+            </a:r>
+            <a:endParaRPr lang="en-GB" dirty="0"/>
+          </a:p>
+        </p:txBody>
+      </p:sp>
+    </p:spTree>
+    <p:extLst>
+      <p:ext uri="{BB962C8B-B14F-4D97-AF65-F5344CB8AC3E}">
+        <p14:creationId xmlns:p14="http://schemas.microsoft.com/office/powerpoint/2010/main" val="2063942789"/>
+      </p:ext>
+    </p:extLst>
+  </p:cSld>
+  <p:clrMapOvr>
+    <a:masterClrMapping/>
+  </p:clrMapOvr>
+</p:sld>
+</file>
+
+<file path=ppt/slides/slide7.xml><?xml version="1.0" encoding="utf-8"?>
+<p:sld xmlns:a="http://schemas.openxmlformats.org/drawingml/2006/main" xmlns:r="http://schemas.openxmlformats.org/officeDocument/2006/relationships" xmlns:p="http://schemas.openxmlformats.org/presentationml/2006/main">
+  <p:cSld>
+    <p:spTree>
+      <p:nvGrpSpPr>
+        <p:cNvPr id="1" name=""/>
+        <p:cNvGrpSpPr/>
+        <p:nvPr/>
+      </p:nvGrpSpPr>
+      <p:grpSpPr>
+        <a:xfrm>
+          <a:off x="0" y="0"/>
+          <a:ext cx="0" cy="0"/>
+          <a:chOff x="0" y="0"/>
+          <a:chExt cx="0" cy="0"/>
+        </a:xfrm>
+      </p:grpSpPr>
+      <p:sp>
+        <p:nvSpPr>
+          <p:cNvPr id="2" name="Title 1"/>
+          <p:cNvSpPr>
+            <a:spLocks noGrp="1"/>
+          </p:cNvSpPr>
+          <p:nvPr>
+            <p:ph type="title"/>
+          </p:nvPr>
+        </p:nvSpPr>
+        <p:spPr/>
+        <p:txBody>
+          <a:bodyPr/>
+          <a:lstStyle/>
+          <a:p>
+            <a:r>
+              <a:rPr lang="en-GB" dirty="0" smtClean="0"/>
               <a:t>Extended Practical on Day 2</a:t>
             </a:r>
             <a:endParaRPr lang="en-GB" dirty="0"/>
@@ -6337,7 +6629,7 @@
 </p:sld>
 </file>
 
-<file path=ppt/slides/slide7.xml><?xml version="1.0" encoding="utf-8"?>
+<file path=ppt/slides/slide8.xml><?xml version="1.0" encoding="utf-8"?>
 <p:sld xmlns:a="http://schemas.openxmlformats.org/drawingml/2006/main" xmlns:r="http://schemas.openxmlformats.org/officeDocument/2006/relationships" xmlns:p="http://schemas.openxmlformats.org/presentationml/2006/main">
   <p:cSld>
     <p:spTree>
@@ -6806,7 +7098,7 @@
 </p:sld>
 </file>
 
-<file path=ppt/slides/slide8.xml><?xml version="1.0" encoding="utf-8"?>
+<file path=ppt/slides/slide9.xml><?xml version="1.0" encoding="utf-8"?>
 <p:sld xmlns:a="http://schemas.openxmlformats.org/drawingml/2006/main" xmlns:r="http://schemas.openxmlformats.org/officeDocument/2006/relationships" xmlns:p="http://schemas.openxmlformats.org/presentationml/2006/main">
   <p:cSld>
     <p:spTree>

</xml_diff>